<commit_message>
Primera version del guion
</commit_message>
<xml_diff>
--- a/ISW_Grupo6_4k2/Teoricos/TP_Conceptuales/TP3/Resolucion_03_Exposicion-Oral-Pecha-Kucha.pptx
+++ b/ISW_Grupo6_4k2/Teoricos/TP_Conceptuales/TP3/Resolucion_03_Exposicion-Oral-Pecha-Kucha.pptx
@@ -123,7 +123,41 @@
       </a:defRPr>
     </a:lvl9pPr>
   </p:defaultTextStyle>
+  <p:extLst>
+    <p:ext uri="{EFAFB233-063F-42B5-8137-9DF3F51BA10A}">
+      <p15:sldGuideLst xmlns:p15="http://schemas.microsoft.com/office/powerpoint/2012/main"/>
+    </p:ext>
+  </p:extLst>
 </p:presentation>
+</file>
+
+<file path=ppt/changesInfos/changesInfo1.xml><?xml version="1.0" encoding="utf-8"?>
+<pc:chgInfo xmlns:a="http://schemas.openxmlformats.org/drawingml/2006/main" xmlns:r="http://schemas.openxmlformats.org/officeDocument/2006/relationships" xmlns:ac="http://schemas.microsoft.com/office/drawing/2013/main/command" xmlns:pc="http://schemas.microsoft.com/office/powerpoint/2013/main/command">
+  <pc:docChgLst>
+    <pc:chgData name="Lautaro Diharce" userId="abf8e9584b87f22c" providerId="LiveId" clId="{E8DBDA76-7FE2-4654-B3A2-9A187473BD94}"/>
+    <pc:docChg chg="custSel modSld">
+      <pc:chgData name="Lautaro Diharce" userId="abf8e9584b87f22c" providerId="LiveId" clId="{E8DBDA76-7FE2-4654-B3A2-9A187473BD94}" dt="2019-11-13T00:02:12.100" v="53" actId="313"/>
+      <pc:docMkLst>
+        <pc:docMk/>
+      </pc:docMkLst>
+      <pc:sldChg chg="modSp">
+        <pc:chgData name="Lautaro Diharce" userId="abf8e9584b87f22c" providerId="LiveId" clId="{E8DBDA76-7FE2-4654-B3A2-9A187473BD94}" dt="2019-11-13T00:02:12.100" v="53" actId="313"/>
+        <pc:sldMkLst>
+          <pc:docMk/>
+          <pc:sldMk cId="1880230516" sldId="275"/>
+        </pc:sldMkLst>
+        <pc:spChg chg="mod">
+          <ac:chgData name="Lautaro Diharce" userId="abf8e9584b87f22c" providerId="LiveId" clId="{E8DBDA76-7FE2-4654-B3A2-9A187473BD94}" dt="2019-11-13T00:02:12.100" v="53" actId="313"/>
+          <ac:spMkLst>
+            <pc:docMk/>
+            <pc:sldMk cId="1880230516" sldId="275"/>
+            <ac:spMk id="4" creationId="{C6ACFE0E-FF40-4475-88DE-3331C3AAE6F2}"/>
+          </ac:spMkLst>
+        </pc:spChg>
+      </pc:sldChg>
+    </pc:docChg>
+  </pc:docChgLst>
+</pc:chgInfo>
 </file>
 
 <file path=ppt/slideLayouts/slideLayout1.xml><?xml version="1.0" encoding="utf-8"?>
@@ -4139,11 +4173,11 @@
   <p:clrMapOvr>
     <a:masterClrMapping/>
   </p:clrMapOvr>
-  <mc:AlternateContent xmlns:mc="http://schemas.openxmlformats.org/markup-compatibility/2006">
-    <mc:Choice xmlns:p14="http://schemas.microsoft.com/office/powerpoint/2010/main" Requires="p14">
+  <mc:AlternateContent xmlns:mc="http://schemas.openxmlformats.org/markup-compatibility/2006" xmlns:p14="http://schemas.microsoft.com/office/powerpoint/2010/main">
+    <mc:Choice Requires="p14">
       <p:transition spd="slow" p14:dur="2000" advClick="0" advTm="20000"/>
     </mc:Choice>
-    <mc:Fallback>
+    <mc:Fallback xmlns="">
       <p:transition spd="slow" advClick="0" advTm="20000"/>
     </mc:Fallback>
   </mc:AlternateContent>
@@ -5806,7 +5840,7 @@
         <p:spPr>
           <a:xfrm>
             <a:off x="847859" y="1880315"/>
-            <a:ext cx="10496281" cy="3693319"/>
+            <a:ext cx="10496281" cy="4801314"/>
           </a:xfrm>
           <a:prstGeom prst="rect">
             <a:avLst/>
@@ -5884,6 +5918,40 @@
             <a:r>
               <a:rPr lang="en-US" dirty="0"/>
               <a:t>https://www.pechakucha.com</a:t>
+            </a:r>
+          </a:p>
+          <a:p>
+            <a:pPr marL="285750" indent="-285750">
+              <a:buFont typeface="Arial" panose="020B0604020202020204" pitchFamily="34" charset="0"/>
+              <a:buChar char="•"/>
+            </a:pPr>
+            <a:endParaRPr lang="en-US" dirty="0"/>
+          </a:p>
+          <a:p>
+            <a:pPr marL="285750" indent="-285750">
+              <a:buFont typeface="Arial" panose="020B0604020202020204" pitchFamily="34" charset="0"/>
+              <a:buChar char="•"/>
+            </a:pPr>
+            <a:r>
+              <a:rPr lang="en-US" dirty="0"/>
+              <a:t>https://www.luxoft-training.com/news/the-agile-testing-manifesto/</a:t>
+            </a:r>
+          </a:p>
+          <a:p>
+            <a:pPr marL="285750" indent="-285750">
+              <a:buFont typeface="Arial" panose="020B0604020202020204" pitchFamily="34" charset="0"/>
+              <a:buChar char="•"/>
+            </a:pPr>
+            <a:endParaRPr lang="en-US" dirty="0"/>
+          </a:p>
+          <a:p>
+            <a:pPr marL="285750" indent="-285750">
+              <a:buFont typeface="Arial" panose="020B0604020202020204" pitchFamily="34" charset="0"/>
+              <a:buChar char="•"/>
+            </a:pPr>
+            <a:r>
+              <a:rPr lang="en-US" dirty="0"/>
+              <a:t>“A coach guide to agile testing” by Samantha Laing and Karen Greaves</a:t>
             </a:r>
           </a:p>
         </p:txBody>

</xml_diff>